<commit_message>
Final Project Presentation Updated
</commit_message>
<xml_diff>
--- a/EC311 XYZ Final Project Presentation.pptx
+++ b/EC311 XYZ Final Project Presentation.pptx
@@ -13258,7 +13258,7 @@
             <a:tbl>
               <a:tblPr>
                 <a:noFill/>
-                <a:tableStyleId>{39721AA9-63D3-452F-A0F3-3F526579D2DA}</a:tableStyleId>
+                <a:tableStyleId>{B137865E-021A-4B62-A5AC-500D09886547}</a:tableStyleId>
               </a:tblPr>
               <a:tblGrid>
                 <a:gridCol w="1181100"/>
@@ -13738,7 +13738,7 @@
             <a:tbl>
               <a:tblPr>
                 <a:noFill/>
-                <a:tableStyleId>{39721AA9-63D3-452F-A0F3-3F526579D2DA}</a:tableStyleId>
+                <a:tableStyleId>{B137865E-021A-4B62-A5AC-500D09886547}</a:tableStyleId>
               </a:tblPr>
               <a:tblGrid>
                 <a:gridCol w="1287375"/>
@@ -14145,7 +14145,7 @@
             <a:tbl>
               <a:tblPr>
                 <a:noFill/>
-                <a:tableStyleId>{39721AA9-63D3-452F-A0F3-3F526579D2DA}</a:tableStyleId>
+                <a:tableStyleId>{B137865E-021A-4B62-A5AC-500D09886547}</a:tableStyleId>
               </a:tblPr>
               <a:tblGrid>
                 <a:gridCol w="990850"/>
@@ -14758,7 +14758,7 @@
             <a:tbl>
               <a:tblPr>
                 <a:noFill/>
-                <a:tableStyleId>{39721AA9-63D3-452F-A0F3-3F526579D2DA}</a:tableStyleId>
+                <a:tableStyleId>{B137865E-021A-4B62-A5AC-500D09886547}</a:tableStyleId>
               </a:tblPr>
               <a:tblGrid>
                 <a:gridCol w="964950"/>
@@ -15315,7 +15315,7 @@
             <a:tbl>
               <a:tblPr>
                 <a:noFill/>
-                <a:tableStyleId>{39721AA9-63D3-452F-A0F3-3F526579D2DA}</a:tableStyleId>
+                <a:tableStyleId>{B137865E-021A-4B62-A5AC-500D09886547}</a:tableStyleId>
               </a:tblPr>
               <a:tblGrid>
                 <a:gridCol w="1181100"/>
@@ -15978,7 +15978,7 @@
             <a:tbl>
               <a:tblPr>
                 <a:noFill/>
-                <a:tableStyleId>{39721AA9-63D3-452F-A0F3-3F526579D2DA}</a:tableStyleId>
+                <a:tableStyleId>{B137865E-021A-4B62-A5AC-500D09886547}</a:tableStyleId>
               </a:tblPr>
               <a:tblGrid>
                 <a:gridCol w="888425"/>
@@ -17906,7 +17906,7 @@
             <a:tbl>
               <a:tblPr>
                 <a:noFill/>
-                <a:tableStyleId>{39721AA9-63D3-452F-A0F3-3F526579D2DA}</a:tableStyleId>
+                <a:tableStyleId>{B137865E-021A-4B62-A5AC-500D09886547}</a:tableStyleId>
               </a:tblPr>
               <a:tblGrid>
                 <a:gridCol w="1181100"/>
@@ -18210,7 +18210,7 @@
             <a:tbl>
               <a:tblPr>
                 <a:noFill/>
-                <a:tableStyleId>{39721AA9-63D3-452F-A0F3-3F526579D2DA}</a:tableStyleId>
+                <a:tableStyleId>{B137865E-021A-4B62-A5AC-500D09886547}</a:tableStyleId>
               </a:tblPr>
               <a:tblGrid>
                 <a:gridCol w="904875"/>
@@ -19999,7 +19999,7 @@
             <a:tbl>
               <a:tblPr>
                 <a:noFill/>
-                <a:tableStyleId>{61E4FFD4-CFF8-4110-9D50-F9822FFF9492}</a:tableStyleId>
+                <a:tableStyleId>{83A96A14-2904-4E23-8994-177CF1C75131}</a:tableStyleId>
               </a:tblPr>
               <a:tblGrid>
                 <a:gridCol w="2110450"/>

</xml_diff>